<commit_message>
Updated Web Application Security presentation
</commit_message>
<xml_diff>
--- a/src/Web Application SECURITY Considerations/Presentation.pptx
+++ b/src/Web Application SECURITY Considerations/Presentation.pptx
@@ -5,7 +5,7 @@
     <p:sldMasterId id="2147483678" r:id="rId1"/>
   </p:sldMasterIdLst>
   <p:notesMasterIdLst>
-    <p:notesMasterId r:id="rId15"/>
+    <p:notesMasterId r:id="rId14"/>
   </p:notesMasterIdLst>
   <p:sldIdLst>
     <p:sldId id="257" r:id="rId2"/>
@@ -19,8 +19,7 @@
     <p:sldId id="601" r:id="rId10"/>
     <p:sldId id="600" r:id="rId11"/>
     <p:sldId id="602" r:id="rId12"/>
-    <p:sldId id="603" r:id="rId13"/>
-    <p:sldId id="271" r:id="rId14"/>
+    <p:sldId id="271" r:id="rId13"/>
   </p:sldIdLst>
   <p:sldSz cx="12192000" cy="6858000"/>
   <p:notesSz cx="6858000" cy="9144000"/>
@@ -209,7 +208,7 @@
           <a:p>
             <a:fld id="{0F9C471C-5CEB-41C5-B26F-30EBC0FE28CB}" type="datetimeFigureOut">
               <a:rPr lang="en-US" smtClean="0"/>
-              <a:t>8/29/2020</a:t>
+              <a:t>9/1/2020</a:t>
             </a:fld>
             <a:endParaRPr lang="en-US"/>
           </a:p>
@@ -661,7 +660,7 @@
           <a:noFill/>
           <a:extLst>
             <a:ext uri="{909E8E84-426E-40dd-AFC4-6F175D3DCCD1}">
-              <a14:hiddenFill xmlns="" xmlns:a14="http://schemas.microsoft.com/office/drawing/2010/main">
+              <a14:hiddenFill xmlns:a14="http://schemas.microsoft.com/office/drawing/2010/main" xmlns="">
                 <a:solidFill>
                   <a:srgbClr val="FFFFFF"/>
                 </a:solidFill>
@@ -721,7 +720,7 @@
             </a:ln>
             <a:extLst>
               <a:ext uri="{91240B29-F687-4f45-9708-019B960494DF}">
-                <a14:hiddenLine xmlns="" xmlns:a14="http://schemas.microsoft.com/office/drawing/2010/main" w="9525">
+                <a14:hiddenLine xmlns:a14="http://schemas.microsoft.com/office/drawing/2010/main" xmlns="" w="9525">
                   <a:solidFill>
                     <a:srgbClr val="000000"/>
                   </a:solidFill>
@@ -811,7 +810,7 @@
             </a:ln>
             <a:extLst>
               <a:ext uri="{91240B29-F687-4f45-9708-019B960494DF}">
-                <a14:hiddenLine xmlns="" xmlns:a14="http://schemas.microsoft.com/office/drawing/2010/main" w="9525">
+                <a14:hiddenLine xmlns:a14="http://schemas.microsoft.com/office/drawing/2010/main" xmlns="" w="9525">
                   <a:solidFill>
                     <a:srgbClr val="000000"/>
                   </a:solidFill>
@@ -901,7 +900,7 @@
             </a:ln>
             <a:extLst>
               <a:ext uri="{91240B29-F687-4f45-9708-019B960494DF}">
-                <a14:hiddenLine xmlns="" xmlns:a14="http://schemas.microsoft.com/office/drawing/2010/main" w="9525">
+                <a14:hiddenLine xmlns:a14="http://schemas.microsoft.com/office/drawing/2010/main" xmlns="" w="9525">
                   <a:solidFill>
                     <a:srgbClr val="000000"/>
                   </a:solidFill>
@@ -935,7 +934,7 @@
             </a:ln>
             <a:extLst>
               <a:ext uri="{91240B29-F687-4f45-9708-019B960494DF}">
-                <a14:hiddenLine xmlns="" xmlns:a14="http://schemas.microsoft.com/office/drawing/2010/main" w="9525">
+                <a14:hiddenLine xmlns:a14="http://schemas.microsoft.com/office/drawing/2010/main" xmlns="" w="9525">
                   <a:solidFill>
                     <a:srgbClr val="000000"/>
                   </a:solidFill>
@@ -1025,7 +1024,7 @@
             </a:ln>
             <a:extLst>
               <a:ext uri="{91240B29-F687-4f45-9708-019B960494DF}">
-                <a14:hiddenLine xmlns="" xmlns:a14="http://schemas.microsoft.com/office/drawing/2010/main" w="9525">
+                <a14:hiddenLine xmlns:a14="http://schemas.microsoft.com/office/drawing/2010/main" xmlns="" w="9525">
                   <a:solidFill>
                     <a:srgbClr val="000000"/>
                   </a:solidFill>
@@ -1087,7 +1086,7 @@
             </a:ln>
             <a:extLst>
               <a:ext uri="{91240B29-F687-4f45-9708-019B960494DF}">
-                <a14:hiddenLine xmlns="" xmlns:a14="http://schemas.microsoft.com/office/drawing/2010/main" w="9525">
+                <a14:hiddenLine xmlns:a14="http://schemas.microsoft.com/office/drawing/2010/main" xmlns="" w="9525">
                   <a:solidFill>
                     <a:srgbClr val="000000"/>
                   </a:solidFill>
@@ -1149,7 +1148,7 @@
             </a:ln>
             <a:extLst>
               <a:ext uri="{91240B29-F687-4f45-9708-019B960494DF}">
-                <a14:hiddenLine xmlns="" xmlns:a14="http://schemas.microsoft.com/office/drawing/2010/main" w="9525">
+                <a14:hiddenLine xmlns:a14="http://schemas.microsoft.com/office/drawing/2010/main" xmlns="" w="9525">
                   <a:solidFill>
                     <a:srgbClr val="000000"/>
                   </a:solidFill>
@@ -1239,7 +1238,7 @@
             </a:ln>
             <a:extLst>
               <a:ext uri="{91240B29-F687-4f45-9708-019B960494DF}">
-                <a14:hiddenLine xmlns="" xmlns:a14="http://schemas.microsoft.com/office/drawing/2010/main" w="9525">
+                <a14:hiddenLine xmlns:a14="http://schemas.microsoft.com/office/drawing/2010/main" xmlns="" w="9525">
                   <a:solidFill>
                     <a:srgbClr val="000000"/>
                   </a:solidFill>
@@ -1301,7 +1300,7 @@
             </a:ln>
             <a:extLst>
               <a:ext uri="{91240B29-F687-4f45-9708-019B960494DF}">
-                <a14:hiddenLine xmlns="" xmlns:a14="http://schemas.microsoft.com/office/drawing/2010/main" w="9525">
+                <a14:hiddenLine xmlns:a14="http://schemas.microsoft.com/office/drawing/2010/main" xmlns="" w="9525">
                   <a:solidFill>
                     <a:srgbClr val="000000"/>
                   </a:solidFill>
@@ -1363,7 +1362,7 @@
             </a:ln>
             <a:extLst>
               <a:ext uri="{91240B29-F687-4f45-9708-019B960494DF}">
-                <a14:hiddenLine xmlns="" xmlns:a14="http://schemas.microsoft.com/office/drawing/2010/main" w="9525">
+                <a14:hiddenLine xmlns:a14="http://schemas.microsoft.com/office/drawing/2010/main" xmlns="" w="9525">
                   <a:solidFill>
                     <a:srgbClr val="000000"/>
                   </a:solidFill>
@@ -1453,7 +1452,7 @@
             </a:ln>
             <a:extLst>
               <a:ext uri="{91240B29-F687-4f45-9708-019B960494DF}">
-                <a14:hiddenLine xmlns="" xmlns:a14="http://schemas.microsoft.com/office/drawing/2010/main" w="9525">
+                <a14:hiddenLine xmlns:a14="http://schemas.microsoft.com/office/drawing/2010/main" xmlns="" w="9525">
                   <a:solidFill>
                     <a:srgbClr val="000000"/>
                   </a:solidFill>
@@ -1543,7 +1542,7 @@
             </a:ln>
             <a:extLst>
               <a:ext uri="{91240B29-F687-4f45-9708-019B960494DF}">
-                <a14:hiddenLine xmlns="" xmlns:a14="http://schemas.microsoft.com/office/drawing/2010/main" w="9525">
+                <a14:hiddenLine xmlns:a14="http://schemas.microsoft.com/office/drawing/2010/main" xmlns="" w="9525">
                   <a:solidFill>
                     <a:srgbClr val="000000"/>
                   </a:solidFill>
@@ -1605,7 +1604,7 @@
             </a:ln>
             <a:extLst>
               <a:ext uri="{91240B29-F687-4f45-9708-019B960494DF}">
-                <a14:hiddenLine xmlns="" xmlns:a14="http://schemas.microsoft.com/office/drawing/2010/main" w="9525">
+                <a14:hiddenLine xmlns:a14="http://schemas.microsoft.com/office/drawing/2010/main" xmlns="" w="9525">
                   <a:solidFill>
                     <a:srgbClr val="000000"/>
                   </a:solidFill>
@@ -1715,7 +1714,7 @@
             </a:ln>
             <a:extLst>
               <a:ext uri="{91240B29-F687-4f45-9708-019B960494DF}">
-                <a14:hiddenLine xmlns="" xmlns:a14="http://schemas.microsoft.com/office/drawing/2010/main" w="9525">
+                <a14:hiddenLine xmlns:a14="http://schemas.microsoft.com/office/drawing/2010/main" xmlns="" w="9525">
                   <a:solidFill>
                     <a:srgbClr val="000000"/>
                   </a:solidFill>
@@ -1777,7 +1776,7 @@
             </a:ln>
             <a:extLst>
               <a:ext uri="{91240B29-F687-4f45-9708-019B960494DF}">
-                <a14:hiddenLine xmlns="" xmlns:a14="http://schemas.microsoft.com/office/drawing/2010/main" w="9525">
+                <a14:hiddenLine xmlns:a14="http://schemas.microsoft.com/office/drawing/2010/main" xmlns="" w="9525">
                   <a:solidFill>
                     <a:srgbClr val="000000"/>
                   </a:solidFill>
@@ -1867,7 +1866,7 @@
             </a:ln>
             <a:extLst>
               <a:ext uri="{91240B29-F687-4f45-9708-019B960494DF}">
-                <a14:hiddenLine xmlns="" xmlns:a14="http://schemas.microsoft.com/office/drawing/2010/main" w="9525">
+                <a14:hiddenLine xmlns:a14="http://schemas.microsoft.com/office/drawing/2010/main" xmlns="" w="9525">
                   <a:solidFill>
                     <a:srgbClr val="000000"/>
                   </a:solidFill>
@@ -1957,7 +1956,7 @@
             </a:ln>
             <a:extLst>
               <a:ext uri="{91240B29-F687-4f45-9708-019B960494DF}">
-                <a14:hiddenLine xmlns="" xmlns:a14="http://schemas.microsoft.com/office/drawing/2010/main" w="9525">
+                <a14:hiddenLine xmlns:a14="http://schemas.microsoft.com/office/drawing/2010/main" xmlns="" w="9525">
                   <a:solidFill>
                     <a:srgbClr val="000000"/>
                   </a:solidFill>
@@ -2019,7 +2018,7 @@
             </a:ln>
             <a:extLst>
               <a:ext uri="{91240B29-F687-4f45-9708-019B960494DF}">
-                <a14:hiddenLine xmlns="" xmlns:a14="http://schemas.microsoft.com/office/drawing/2010/main" w="9525">
+                <a14:hiddenLine xmlns:a14="http://schemas.microsoft.com/office/drawing/2010/main" xmlns="" w="9525">
                   <a:solidFill>
                     <a:srgbClr val="000000"/>
                   </a:solidFill>
@@ -2109,7 +2108,7 @@
             </a:ln>
             <a:extLst>
               <a:ext uri="{91240B29-F687-4f45-9708-019B960494DF}">
-                <a14:hiddenLine xmlns="" xmlns:a14="http://schemas.microsoft.com/office/drawing/2010/main" w="9525">
+                <a14:hiddenLine xmlns:a14="http://schemas.microsoft.com/office/drawing/2010/main" xmlns="" w="9525">
                   <a:solidFill>
                     <a:srgbClr val="000000"/>
                   </a:solidFill>
@@ -2199,7 +2198,7 @@
             </a:ln>
             <a:extLst>
               <a:ext uri="{91240B29-F687-4f45-9708-019B960494DF}">
-                <a14:hiddenLine xmlns="" xmlns:a14="http://schemas.microsoft.com/office/drawing/2010/main" w="9525">
+                <a14:hiddenLine xmlns:a14="http://schemas.microsoft.com/office/drawing/2010/main" xmlns="" w="9525">
                   <a:solidFill>
                     <a:srgbClr val="000000"/>
                   </a:solidFill>
@@ -2255,7 +2254,7 @@
             </a:ln>
             <a:extLst>
               <a:ext uri="{91240B29-F687-4f45-9708-019B960494DF}">
-                <a14:hiddenLine xmlns="" xmlns:a14="http://schemas.microsoft.com/office/drawing/2010/main" w="9525">
+                <a14:hiddenLine xmlns:a14="http://schemas.microsoft.com/office/drawing/2010/main" xmlns="" w="9525">
                   <a:solidFill>
                     <a:srgbClr val="000000"/>
                   </a:solidFill>
@@ -2345,7 +2344,7 @@
             </a:ln>
             <a:extLst>
               <a:ext uri="{91240B29-F687-4f45-9708-019B960494DF}">
-                <a14:hiddenLine xmlns="" xmlns:a14="http://schemas.microsoft.com/office/drawing/2010/main" w="9525">
+                <a14:hiddenLine xmlns:a14="http://schemas.microsoft.com/office/drawing/2010/main" xmlns="" w="9525">
                   <a:solidFill>
                     <a:srgbClr val="000000"/>
                   </a:solidFill>
@@ -2401,7 +2400,7 @@
             </a:ln>
             <a:extLst>
               <a:ext uri="{91240B29-F687-4f45-9708-019B960494DF}">
-                <a14:hiddenLine xmlns="" xmlns:a14="http://schemas.microsoft.com/office/drawing/2010/main" w="9525">
+                <a14:hiddenLine xmlns:a14="http://schemas.microsoft.com/office/drawing/2010/main" xmlns="" w="9525">
                   <a:solidFill>
                     <a:srgbClr val="000000"/>
                   </a:solidFill>
@@ -2491,7 +2490,7 @@
             </a:ln>
             <a:extLst>
               <a:ext uri="{91240B29-F687-4f45-9708-019B960494DF}">
-                <a14:hiddenLine xmlns="" xmlns:a14="http://schemas.microsoft.com/office/drawing/2010/main" w="9525">
+                <a14:hiddenLine xmlns:a14="http://schemas.microsoft.com/office/drawing/2010/main" xmlns="" w="9525">
                   <a:solidFill>
                     <a:srgbClr val="000000"/>
                   </a:solidFill>
@@ -2559,7 +2558,7 @@
             </a:ln>
             <a:extLst>
               <a:ext uri="{91240B29-F687-4f45-9708-019B960494DF}">
-                <a14:hiddenLine xmlns="" xmlns:a14="http://schemas.microsoft.com/office/drawing/2010/main" w="9525">
+                <a14:hiddenLine xmlns:a14="http://schemas.microsoft.com/office/drawing/2010/main" xmlns="" w="9525">
                   <a:solidFill>
                     <a:srgbClr val="000000"/>
                   </a:solidFill>
@@ -2649,7 +2648,7 @@
             </a:ln>
             <a:extLst>
               <a:ext uri="{91240B29-F687-4f45-9708-019B960494DF}">
-                <a14:hiddenLine xmlns="" xmlns:a14="http://schemas.microsoft.com/office/drawing/2010/main" w="9525">
+                <a14:hiddenLine xmlns:a14="http://schemas.microsoft.com/office/drawing/2010/main" xmlns="" w="9525">
                   <a:solidFill>
                     <a:srgbClr val="000000"/>
                   </a:solidFill>
@@ -2717,7 +2716,7 @@
             </a:ln>
             <a:extLst>
               <a:ext uri="{91240B29-F687-4f45-9708-019B960494DF}">
-                <a14:hiddenLine xmlns="" xmlns:a14="http://schemas.microsoft.com/office/drawing/2010/main" w="9525">
+                <a14:hiddenLine xmlns:a14="http://schemas.microsoft.com/office/drawing/2010/main" xmlns="" w="9525">
                   <a:solidFill>
                     <a:srgbClr val="000000"/>
                   </a:solidFill>
@@ -2807,7 +2806,7 @@
             </a:ln>
             <a:extLst>
               <a:ext uri="{91240B29-F687-4f45-9708-019B960494DF}">
-                <a14:hiddenLine xmlns="" xmlns:a14="http://schemas.microsoft.com/office/drawing/2010/main" w="9525">
+                <a14:hiddenLine xmlns:a14="http://schemas.microsoft.com/office/drawing/2010/main" xmlns="" w="9525">
                   <a:solidFill>
                     <a:srgbClr val="000000"/>
                   </a:solidFill>
@@ -2841,7 +2840,7 @@
             </a:ln>
             <a:extLst>
               <a:ext uri="{91240B29-F687-4f45-9708-019B960494DF}">
-                <a14:hiddenLine xmlns="" xmlns:a14="http://schemas.microsoft.com/office/drawing/2010/main" w="9525">
+                <a14:hiddenLine xmlns:a14="http://schemas.microsoft.com/office/drawing/2010/main" xmlns="" w="9525">
                   <a:solidFill>
                     <a:srgbClr val="000000"/>
                   </a:solidFill>
@@ -2931,7 +2930,7 @@
             </a:ln>
             <a:extLst>
               <a:ext uri="{91240B29-F687-4f45-9708-019B960494DF}">
-                <a14:hiddenLine xmlns="" xmlns:a14="http://schemas.microsoft.com/office/drawing/2010/main" w="9525">
+                <a14:hiddenLine xmlns:a14="http://schemas.microsoft.com/office/drawing/2010/main" xmlns="" w="9525">
                   <a:solidFill>
                     <a:srgbClr val="000000"/>
                   </a:solidFill>
@@ -2993,7 +2992,7 @@
             </a:ln>
             <a:extLst>
               <a:ext uri="{91240B29-F687-4f45-9708-019B960494DF}">
-                <a14:hiddenLine xmlns="" xmlns:a14="http://schemas.microsoft.com/office/drawing/2010/main" w="9525">
+                <a14:hiddenLine xmlns:a14="http://schemas.microsoft.com/office/drawing/2010/main" xmlns="" w="9525">
                   <a:solidFill>
                     <a:srgbClr val="000000"/>
                   </a:solidFill>
@@ -3055,7 +3054,7 @@
             </a:ln>
             <a:extLst>
               <a:ext uri="{91240B29-F687-4f45-9708-019B960494DF}">
-                <a14:hiddenLine xmlns="" xmlns:a14="http://schemas.microsoft.com/office/drawing/2010/main" w="9525">
+                <a14:hiddenLine xmlns:a14="http://schemas.microsoft.com/office/drawing/2010/main" xmlns="" w="9525">
                   <a:solidFill>
                     <a:srgbClr val="000000"/>
                   </a:solidFill>
@@ -3145,7 +3144,7 @@
             </a:ln>
             <a:extLst>
               <a:ext uri="{91240B29-F687-4f45-9708-019B960494DF}">
-                <a14:hiddenLine xmlns="" xmlns:a14="http://schemas.microsoft.com/office/drawing/2010/main" w="9525">
+                <a14:hiddenLine xmlns:a14="http://schemas.microsoft.com/office/drawing/2010/main" xmlns="" w="9525">
                   <a:solidFill>
                     <a:srgbClr val="000000"/>
                   </a:solidFill>
@@ -3213,7 +3212,7 @@
             </a:ln>
             <a:extLst>
               <a:ext uri="{91240B29-F687-4f45-9708-019B960494DF}">
-                <a14:hiddenLine xmlns="" xmlns:a14="http://schemas.microsoft.com/office/drawing/2010/main" w="9525">
+                <a14:hiddenLine xmlns:a14="http://schemas.microsoft.com/office/drawing/2010/main" xmlns="" w="9525">
                   <a:solidFill>
                     <a:srgbClr val="000000"/>
                   </a:solidFill>
@@ -3275,7 +3274,7 @@
             </a:ln>
             <a:extLst>
               <a:ext uri="{91240B29-F687-4f45-9708-019B960494DF}">
-                <a14:hiddenLine xmlns="" xmlns:a14="http://schemas.microsoft.com/office/drawing/2010/main" w="9525">
+                <a14:hiddenLine xmlns:a14="http://schemas.microsoft.com/office/drawing/2010/main" xmlns="" w="9525">
                   <a:solidFill>
                     <a:srgbClr val="000000"/>
                   </a:solidFill>
@@ -3365,7 +3364,7 @@
             </a:ln>
             <a:extLst>
               <a:ext uri="{91240B29-F687-4f45-9708-019B960494DF}">
-                <a14:hiddenLine xmlns="" xmlns:a14="http://schemas.microsoft.com/office/drawing/2010/main" w="9525">
+                <a14:hiddenLine xmlns:a14="http://schemas.microsoft.com/office/drawing/2010/main" xmlns="" w="9525">
                   <a:solidFill>
                     <a:srgbClr val="000000"/>
                   </a:solidFill>
@@ -3427,7 +3426,7 @@
             </a:ln>
             <a:extLst>
               <a:ext uri="{91240B29-F687-4f45-9708-019B960494DF}">
-                <a14:hiddenLine xmlns="" xmlns:a14="http://schemas.microsoft.com/office/drawing/2010/main" w="9525">
+                <a14:hiddenLine xmlns:a14="http://schemas.microsoft.com/office/drawing/2010/main" xmlns="" w="9525">
                   <a:solidFill>
                     <a:srgbClr val="000000"/>
                   </a:solidFill>
@@ -3517,7 +3516,7 @@
             </a:ln>
             <a:extLst>
               <a:ext uri="{91240B29-F687-4f45-9708-019B960494DF}">
-                <a14:hiddenLine xmlns="" xmlns:a14="http://schemas.microsoft.com/office/drawing/2010/main" w="9525">
+                <a14:hiddenLine xmlns:a14="http://schemas.microsoft.com/office/drawing/2010/main" xmlns="" w="9525">
                   <a:solidFill>
                     <a:srgbClr val="000000"/>
                   </a:solidFill>
@@ -3579,7 +3578,7 @@
             </a:ln>
             <a:extLst>
               <a:ext uri="{91240B29-F687-4f45-9708-019B960494DF}">
-                <a14:hiddenLine xmlns="" xmlns:a14="http://schemas.microsoft.com/office/drawing/2010/main" w="9525">
+                <a14:hiddenLine xmlns:a14="http://schemas.microsoft.com/office/drawing/2010/main" xmlns="" w="9525">
                   <a:solidFill>
                     <a:srgbClr val="000000"/>
                   </a:solidFill>
@@ -3669,7 +3668,7 @@
             </a:ln>
             <a:extLst>
               <a:ext uri="{91240B29-F687-4f45-9708-019B960494DF}">
-                <a14:hiddenLine xmlns="" xmlns:a14="http://schemas.microsoft.com/office/drawing/2010/main" w="9525">
+                <a14:hiddenLine xmlns:a14="http://schemas.microsoft.com/office/drawing/2010/main" xmlns="" w="9525">
                   <a:solidFill>
                     <a:srgbClr val="000000"/>
                   </a:solidFill>
@@ -3703,7 +3702,7 @@
             </a:ln>
             <a:extLst>
               <a:ext uri="{91240B29-F687-4f45-9708-019B960494DF}">
-                <a14:hiddenLine xmlns="" xmlns:a14="http://schemas.microsoft.com/office/drawing/2010/main" w="9525">
+                <a14:hiddenLine xmlns:a14="http://schemas.microsoft.com/office/drawing/2010/main" xmlns="" w="9525">
                   <a:solidFill>
                     <a:srgbClr val="000000"/>
                   </a:solidFill>
@@ -3768,7 +3767,7 @@
             </a:ln>
             <a:extLst>
               <a:ext uri="{91240B29-F687-4f45-9708-019B960494DF}">
-                <a14:hiddenLine xmlns="" xmlns:a14="http://schemas.microsoft.com/office/drawing/2010/main" w="9525">
+                <a14:hiddenLine xmlns:a14="http://schemas.microsoft.com/office/drawing/2010/main" xmlns="" w="9525">
                   <a:solidFill>
                     <a:srgbClr val="000000"/>
                   </a:solidFill>
@@ -3858,7 +3857,7 @@
             </a:ln>
             <a:extLst>
               <a:ext uri="{91240B29-F687-4f45-9708-019B960494DF}">
-                <a14:hiddenLine xmlns="" xmlns:a14="http://schemas.microsoft.com/office/drawing/2010/main" w="9525">
+                <a14:hiddenLine xmlns:a14="http://schemas.microsoft.com/office/drawing/2010/main" xmlns="" w="9525">
                   <a:solidFill>
                     <a:srgbClr val="000000"/>
                   </a:solidFill>
@@ -3920,7 +3919,7 @@
             </a:ln>
             <a:extLst>
               <a:ext uri="{91240B29-F687-4f45-9708-019B960494DF}">
-                <a14:hiddenLine xmlns="" xmlns:a14="http://schemas.microsoft.com/office/drawing/2010/main" w="9525">
+                <a14:hiddenLine xmlns:a14="http://schemas.microsoft.com/office/drawing/2010/main" xmlns="" w="9525">
                   <a:solidFill>
                     <a:srgbClr val="000000"/>
                   </a:solidFill>
@@ -4010,7 +4009,7 @@
             </a:ln>
             <a:extLst>
               <a:ext uri="{91240B29-F687-4f45-9708-019B960494DF}">
-                <a14:hiddenLine xmlns="" xmlns:a14="http://schemas.microsoft.com/office/drawing/2010/main" w="9525">
+                <a14:hiddenLine xmlns:a14="http://schemas.microsoft.com/office/drawing/2010/main" xmlns="" w="9525">
                   <a:solidFill>
                     <a:srgbClr val="000000"/>
                   </a:solidFill>
@@ -4100,7 +4099,7 @@
             </a:ln>
             <a:extLst>
               <a:ext uri="{91240B29-F687-4f45-9708-019B960494DF}">
-                <a14:hiddenLine xmlns="" xmlns:a14="http://schemas.microsoft.com/office/drawing/2010/main" w="9525">
+                <a14:hiddenLine xmlns:a14="http://schemas.microsoft.com/office/drawing/2010/main" xmlns="" w="9525">
                   <a:solidFill>
                     <a:srgbClr val="000000"/>
                   </a:solidFill>
@@ -4165,7 +4164,7 @@
             </a:ln>
             <a:extLst>
               <a:ext uri="{91240B29-F687-4f45-9708-019B960494DF}">
-                <a14:hiddenLine xmlns="" xmlns:a14="http://schemas.microsoft.com/office/drawing/2010/main" w="9525">
+                <a14:hiddenLine xmlns:a14="http://schemas.microsoft.com/office/drawing/2010/main" xmlns="" w="9525">
                   <a:solidFill>
                     <a:srgbClr val="000000"/>
                   </a:solidFill>
@@ -4227,7 +4226,7 @@
             </a:ln>
             <a:extLst>
               <a:ext uri="{91240B29-F687-4f45-9708-019B960494DF}">
-                <a14:hiddenLine xmlns="" xmlns:a14="http://schemas.microsoft.com/office/drawing/2010/main" w="9525">
+                <a14:hiddenLine xmlns:a14="http://schemas.microsoft.com/office/drawing/2010/main" xmlns="" w="9525">
                   <a:solidFill>
                     <a:srgbClr val="000000"/>
                   </a:solidFill>
@@ -4317,7 +4316,7 @@
             </a:ln>
             <a:extLst>
               <a:ext uri="{91240B29-F687-4f45-9708-019B960494DF}">
-                <a14:hiddenLine xmlns="" xmlns:a14="http://schemas.microsoft.com/office/drawing/2010/main" w="9525">
+                <a14:hiddenLine xmlns:a14="http://schemas.microsoft.com/office/drawing/2010/main" xmlns="" w="9525">
                   <a:solidFill>
                     <a:srgbClr val="000000"/>
                   </a:solidFill>
@@ -4407,7 +4406,7 @@
             </a:ln>
             <a:extLst>
               <a:ext uri="{91240B29-F687-4f45-9708-019B960494DF}">
-                <a14:hiddenLine xmlns="" xmlns:a14="http://schemas.microsoft.com/office/drawing/2010/main" w="9525">
+                <a14:hiddenLine xmlns:a14="http://schemas.microsoft.com/office/drawing/2010/main" xmlns="" w="9525">
                   <a:solidFill>
                     <a:srgbClr val="000000"/>
                   </a:solidFill>
@@ -4469,7 +4468,7 @@
             </a:ln>
             <a:extLst>
               <a:ext uri="{91240B29-F687-4f45-9708-019B960494DF}">
-                <a14:hiddenLine xmlns="" xmlns:a14="http://schemas.microsoft.com/office/drawing/2010/main" w="9525">
+                <a14:hiddenLine xmlns:a14="http://schemas.microsoft.com/office/drawing/2010/main" xmlns="" w="9525">
                   <a:solidFill>
                     <a:srgbClr val="000000"/>
                   </a:solidFill>
@@ -4589,7 +4588,7 @@
             </a:ln>
             <a:extLst>
               <a:ext uri="{91240B29-F687-4f45-9708-019B960494DF}">
-                <a14:hiddenLine xmlns="" xmlns:a14="http://schemas.microsoft.com/office/drawing/2010/main" w="9525">
+                <a14:hiddenLine xmlns:a14="http://schemas.microsoft.com/office/drawing/2010/main" xmlns="" w="9525">
                   <a:solidFill>
                     <a:srgbClr val="000000"/>
                   </a:solidFill>
@@ -4657,7 +4656,7 @@
             </a:ln>
             <a:extLst>
               <a:ext uri="{91240B29-F687-4f45-9708-019B960494DF}">
-                <a14:hiddenLine xmlns="" xmlns:a14="http://schemas.microsoft.com/office/drawing/2010/main" w="9525">
+                <a14:hiddenLine xmlns:a14="http://schemas.microsoft.com/office/drawing/2010/main" xmlns="" w="9525">
                   <a:solidFill>
                     <a:srgbClr val="000000"/>
                   </a:solidFill>
@@ -4747,7 +4746,7 @@
             </a:ln>
             <a:extLst>
               <a:ext uri="{91240B29-F687-4f45-9708-019B960494DF}">
-                <a14:hiddenLine xmlns="" xmlns:a14="http://schemas.microsoft.com/office/drawing/2010/main" w="9525">
+                <a14:hiddenLine xmlns:a14="http://schemas.microsoft.com/office/drawing/2010/main" xmlns="" w="9525">
                   <a:solidFill>
                     <a:srgbClr val="000000"/>
                   </a:solidFill>
@@ -4887,7 +4886,7 @@
           <a:p>
             <a:fld id="{F34B6E3E-06F4-4326-ABDB-61EE022A2F5F}" type="datetimeFigureOut">
               <a:rPr lang="en-US" smtClean="0"/>
-              <a:t>8/29/2020</a:t>
+              <a:t>9/1/2020</a:t>
             </a:fld>
             <a:endParaRPr lang="en-US"/>
           </a:p>
@@ -5154,7 +5153,7 @@
           <a:p>
             <a:fld id="{F34B6E3E-06F4-4326-ABDB-61EE022A2F5F}" type="datetimeFigureOut">
               <a:rPr lang="en-US" smtClean="0"/>
-              <a:t>8/29/2020</a:t>
+              <a:t>9/1/2020</a:t>
             </a:fld>
             <a:endParaRPr lang="en-US"/>
           </a:p>
@@ -5350,7 +5349,7 @@
           <a:p>
             <a:fld id="{F34B6E3E-06F4-4326-ABDB-61EE022A2F5F}" type="datetimeFigureOut">
               <a:rPr lang="en-US" smtClean="0"/>
-              <a:t>8/29/2020</a:t>
+              <a:t>9/1/2020</a:t>
             </a:fld>
             <a:endParaRPr lang="en-US"/>
           </a:p>
@@ -5613,7 +5612,7 @@
           <a:p>
             <a:fld id="{F34B6E3E-06F4-4326-ABDB-61EE022A2F5F}" type="datetimeFigureOut">
               <a:rPr lang="en-US" smtClean="0"/>
-              <a:t>8/29/2020</a:t>
+              <a:t>9/1/2020</a:t>
             </a:fld>
             <a:endParaRPr lang="en-US"/>
           </a:p>
@@ -6047,7 +6046,7 @@
           <a:p>
             <a:fld id="{F34B6E3E-06F4-4326-ABDB-61EE022A2F5F}" type="datetimeFigureOut">
               <a:rPr lang="en-US" smtClean="0"/>
-              <a:t>8/29/2020</a:t>
+              <a:t>9/1/2020</a:t>
             </a:fld>
             <a:endParaRPr lang="en-US"/>
           </a:p>
@@ -6593,7 +6592,7 @@
           <a:p>
             <a:fld id="{F34B6E3E-06F4-4326-ABDB-61EE022A2F5F}" type="datetimeFigureOut">
               <a:rPr lang="en-US" smtClean="0"/>
-              <a:t>8/29/2020</a:t>
+              <a:t>9/1/2020</a:t>
             </a:fld>
             <a:endParaRPr lang="en-US"/>
           </a:p>
@@ -7313,7 +7312,7 @@
           <a:p>
             <a:fld id="{F34B6E3E-06F4-4326-ABDB-61EE022A2F5F}" type="datetimeFigureOut">
               <a:rPr lang="en-US" smtClean="0"/>
-              <a:t>8/29/2020</a:t>
+              <a:t>9/1/2020</a:t>
             </a:fld>
             <a:endParaRPr lang="en-US"/>
           </a:p>
@@ -7483,7 +7482,7 @@
           <a:p>
             <a:fld id="{F34B6E3E-06F4-4326-ABDB-61EE022A2F5F}" type="datetimeFigureOut">
               <a:rPr lang="en-US" smtClean="0"/>
-              <a:t>8/29/2020</a:t>
+              <a:t>9/1/2020</a:t>
             </a:fld>
             <a:endParaRPr lang="en-US"/>
           </a:p>
@@ -7663,7 +7662,7 @@
           <a:p>
             <a:fld id="{F34B6E3E-06F4-4326-ABDB-61EE022A2F5F}" type="datetimeFigureOut">
               <a:rPr lang="en-US" smtClean="0"/>
-              <a:t>8/29/2020</a:t>
+              <a:t>9/1/2020</a:t>
             </a:fld>
             <a:endParaRPr lang="en-US"/>
           </a:p>
@@ -8331,7 +8330,7 @@
           <a:p>
             <a:fld id="{F34B6E3E-06F4-4326-ABDB-61EE022A2F5F}" type="datetimeFigureOut">
               <a:rPr lang="en-US" smtClean="0"/>
-              <a:t>8/29/2020</a:t>
+              <a:t>9/1/2020</a:t>
             </a:fld>
             <a:endParaRPr lang="en-US"/>
           </a:p>
@@ -8581,7 +8580,7 @@
           <a:p>
             <a:fld id="{F34B6E3E-06F4-4326-ABDB-61EE022A2F5F}" type="datetimeFigureOut">
               <a:rPr lang="en-US" smtClean="0"/>
-              <a:t>8/29/2020</a:t>
+              <a:t>9/1/2020</a:t>
             </a:fld>
             <a:endParaRPr lang="en-US"/>
           </a:p>
@@ -8813,7 +8812,7 @@
           <a:p>
             <a:fld id="{F34B6E3E-06F4-4326-ABDB-61EE022A2F5F}" type="datetimeFigureOut">
               <a:rPr lang="en-US" smtClean="0"/>
-              <a:t>8/29/2020</a:t>
+              <a:t>9/1/2020</a:t>
             </a:fld>
             <a:endParaRPr lang="en-US"/>
           </a:p>
@@ -9194,7 +9193,7 @@
           <a:p>
             <a:fld id="{F34B6E3E-06F4-4326-ABDB-61EE022A2F5F}" type="datetimeFigureOut">
               <a:rPr lang="en-US" smtClean="0"/>
-              <a:t>8/29/2020</a:t>
+              <a:t>9/1/2020</a:t>
             </a:fld>
             <a:endParaRPr lang="en-US"/>
           </a:p>
@@ -9312,7 +9311,7 @@
           <a:p>
             <a:fld id="{F34B6E3E-06F4-4326-ABDB-61EE022A2F5F}" type="datetimeFigureOut">
               <a:rPr lang="en-US" smtClean="0"/>
-              <a:t>8/29/2020</a:t>
+              <a:t>9/1/2020</a:t>
             </a:fld>
             <a:endParaRPr lang="en-US"/>
           </a:p>
@@ -9407,7 +9406,7 @@
           <a:p>
             <a:fld id="{F34B6E3E-06F4-4326-ABDB-61EE022A2F5F}" type="datetimeFigureOut">
               <a:rPr lang="en-US" smtClean="0"/>
-              <a:t>8/29/2020</a:t>
+              <a:t>9/1/2020</a:t>
             </a:fld>
             <a:endParaRPr lang="en-US"/>
           </a:p>
@@ -9656,7 +9655,7 @@
           <a:p>
             <a:fld id="{F34B6E3E-06F4-4326-ABDB-61EE022A2F5F}" type="datetimeFigureOut">
               <a:rPr lang="en-US" smtClean="0"/>
-              <a:t>8/29/2020</a:t>
+              <a:t>9/1/2020</a:t>
             </a:fld>
             <a:endParaRPr lang="en-US"/>
           </a:p>
@@ -9936,7 +9935,7 @@
           <a:p>
             <a:fld id="{F34B6E3E-06F4-4326-ABDB-61EE022A2F5F}" type="datetimeFigureOut">
               <a:rPr lang="en-US" smtClean="0"/>
-              <a:t>8/29/2020</a:t>
+              <a:t>9/1/2020</a:t>
             </a:fld>
             <a:endParaRPr lang="en-US"/>
           </a:p>
@@ -10052,7 +10051,7 @@
           <a:noFill/>
           <a:extLst>
             <a:ext uri="{909E8E84-426E-40dd-AFC4-6F175D3DCCD1}">
-              <a14:hiddenFill xmlns="" xmlns:a14="http://schemas.microsoft.com/office/drawing/2010/main">
+              <a14:hiddenFill xmlns:a14="http://schemas.microsoft.com/office/drawing/2010/main" xmlns="">
                 <a:solidFill>
                   <a:srgbClr val="FFFFFF"/>
                 </a:solidFill>
@@ -10126,7 +10125,7 @@
               </a:ln>
               <a:extLst>
                 <a:ext uri="{91240B29-F687-4f45-9708-019B960494DF}">
-                  <a14:hiddenLine xmlns="" xmlns:a14="http://schemas.microsoft.com/office/drawing/2010/main" w="9525">
+                  <a14:hiddenLine xmlns:a14="http://schemas.microsoft.com/office/drawing/2010/main" xmlns="" w="9525">
                     <a:solidFill>
                       <a:srgbClr val="000000"/>
                     </a:solidFill>
@@ -10216,7 +10215,7 @@
               </a:ln>
               <a:extLst>
                 <a:ext uri="{91240B29-F687-4f45-9708-019B960494DF}">
-                  <a14:hiddenLine xmlns="" xmlns:a14="http://schemas.microsoft.com/office/drawing/2010/main" w="9525">
+                  <a14:hiddenLine xmlns:a14="http://schemas.microsoft.com/office/drawing/2010/main" xmlns="" w="9525">
                     <a:solidFill>
                       <a:srgbClr val="000000"/>
                     </a:solidFill>
@@ -10306,7 +10305,7 @@
               </a:ln>
               <a:extLst>
                 <a:ext uri="{91240B29-F687-4f45-9708-019B960494DF}">
-                  <a14:hiddenLine xmlns="" xmlns:a14="http://schemas.microsoft.com/office/drawing/2010/main" w="9525">
+                  <a14:hiddenLine xmlns:a14="http://schemas.microsoft.com/office/drawing/2010/main" xmlns="" w="9525">
                     <a:solidFill>
                       <a:srgbClr val="000000"/>
                     </a:solidFill>
@@ -10368,7 +10367,7 @@
               </a:ln>
               <a:extLst>
                 <a:ext uri="{91240B29-F687-4f45-9708-019B960494DF}">
-                  <a14:hiddenLine xmlns="" xmlns:a14="http://schemas.microsoft.com/office/drawing/2010/main" w="9525">
+                  <a14:hiddenLine xmlns:a14="http://schemas.microsoft.com/office/drawing/2010/main" xmlns="" w="9525">
                     <a:solidFill>
                       <a:srgbClr val="000000"/>
                     </a:solidFill>
@@ -10458,7 +10457,7 @@
               </a:ln>
               <a:extLst>
                 <a:ext uri="{91240B29-F687-4f45-9708-019B960494DF}">
-                  <a14:hiddenLine xmlns="" xmlns:a14="http://schemas.microsoft.com/office/drawing/2010/main" w="9525">
+                  <a14:hiddenLine xmlns:a14="http://schemas.microsoft.com/office/drawing/2010/main" xmlns="" w="9525">
                     <a:solidFill>
                       <a:srgbClr val="000000"/>
                     </a:solidFill>
@@ -10520,7 +10519,7 @@
               </a:ln>
               <a:extLst>
                 <a:ext uri="{91240B29-F687-4f45-9708-019B960494DF}">
-                  <a14:hiddenLine xmlns="" xmlns:a14="http://schemas.microsoft.com/office/drawing/2010/main" w="9525">
+                  <a14:hiddenLine xmlns:a14="http://schemas.microsoft.com/office/drawing/2010/main" xmlns="" w="9525">
                     <a:solidFill>
                       <a:srgbClr val="000000"/>
                     </a:solidFill>
@@ -10582,7 +10581,7 @@
               </a:ln>
               <a:extLst>
                 <a:ext uri="{91240B29-F687-4f45-9708-019B960494DF}">
-                  <a14:hiddenLine xmlns="" xmlns:a14="http://schemas.microsoft.com/office/drawing/2010/main" w="9525">
+                  <a14:hiddenLine xmlns:a14="http://schemas.microsoft.com/office/drawing/2010/main" xmlns="" w="9525">
                     <a:solidFill>
                       <a:srgbClr val="000000"/>
                     </a:solidFill>
@@ -10672,7 +10671,7 @@
               </a:ln>
               <a:extLst>
                 <a:ext uri="{91240B29-F687-4f45-9708-019B960494DF}">
-                  <a14:hiddenLine xmlns="" xmlns:a14="http://schemas.microsoft.com/office/drawing/2010/main" w="9525">
+                  <a14:hiddenLine xmlns:a14="http://schemas.microsoft.com/office/drawing/2010/main" xmlns="" w="9525">
                     <a:solidFill>
                       <a:srgbClr val="000000"/>
                     </a:solidFill>
@@ -10762,7 +10761,7 @@
               </a:ln>
               <a:extLst>
                 <a:ext uri="{91240B29-F687-4f45-9708-019B960494DF}">
-                  <a14:hiddenLine xmlns="" xmlns:a14="http://schemas.microsoft.com/office/drawing/2010/main" w="9525">
+                  <a14:hiddenLine xmlns:a14="http://schemas.microsoft.com/office/drawing/2010/main" xmlns="" w="9525">
                     <a:solidFill>
                       <a:srgbClr val="000000"/>
                     </a:solidFill>
@@ -10824,7 +10823,7 @@
               </a:ln>
               <a:extLst>
                 <a:ext uri="{91240B29-F687-4f45-9708-019B960494DF}">
-                  <a14:hiddenLine xmlns="" xmlns:a14="http://schemas.microsoft.com/office/drawing/2010/main" w="9525">
+                  <a14:hiddenLine xmlns:a14="http://schemas.microsoft.com/office/drawing/2010/main" xmlns="" w="9525">
                     <a:solidFill>
                       <a:srgbClr val="000000"/>
                     </a:solidFill>
@@ -10934,7 +10933,7 @@
               </a:ln>
               <a:extLst>
                 <a:ext uri="{91240B29-F687-4f45-9708-019B960494DF}">
-                  <a14:hiddenLine xmlns="" xmlns:a14="http://schemas.microsoft.com/office/drawing/2010/main" w="9525">
+                  <a14:hiddenLine xmlns:a14="http://schemas.microsoft.com/office/drawing/2010/main" xmlns="" w="9525">
                     <a:solidFill>
                       <a:srgbClr val="000000"/>
                     </a:solidFill>
@@ -11018,7 +11017,7 @@
               </a:ln>
               <a:extLst>
                 <a:ext uri="{91240B29-F687-4f45-9708-019B960494DF}">
-                  <a14:hiddenLine xmlns="" xmlns:a14="http://schemas.microsoft.com/office/drawing/2010/main" w="9525">
+                  <a14:hiddenLine xmlns:a14="http://schemas.microsoft.com/office/drawing/2010/main" xmlns="" w="9525">
                     <a:solidFill>
                       <a:srgbClr val="000000"/>
                     </a:solidFill>
@@ -11080,7 +11079,7 @@
               </a:ln>
               <a:extLst>
                 <a:ext uri="{91240B29-F687-4f45-9708-019B960494DF}">
-                  <a14:hiddenLine xmlns="" xmlns:a14="http://schemas.microsoft.com/office/drawing/2010/main" w="9525">
+                  <a14:hiddenLine xmlns:a14="http://schemas.microsoft.com/office/drawing/2010/main" xmlns="" w="9525">
                     <a:solidFill>
                       <a:srgbClr val="000000"/>
                     </a:solidFill>
@@ -11142,7 +11141,7 @@
               </a:ln>
               <a:extLst>
                 <a:ext uri="{91240B29-F687-4f45-9708-019B960494DF}">
-                  <a14:hiddenLine xmlns="" xmlns:a14="http://schemas.microsoft.com/office/drawing/2010/main" w="9525">
+                  <a14:hiddenLine xmlns:a14="http://schemas.microsoft.com/office/drawing/2010/main" xmlns="" w="9525">
                     <a:solidFill>
                       <a:srgbClr val="000000"/>
                     </a:solidFill>
@@ -11232,7 +11231,7 @@
               </a:ln>
               <a:extLst>
                 <a:ext uri="{91240B29-F687-4f45-9708-019B960494DF}">
-                  <a14:hiddenLine xmlns="" xmlns:a14="http://schemas.microsoft.com/office/drawing/2010/main" w="9525">
+                  <a14:hiddenLine xmlns:a14="http://schemas.microsoft.com/office/drawing/2010/main" xmlns="" w="9525">
                     <a:solidFill>
                       <a:srgbClr val="000000"/>
                     </a:solidFill>
@@ -11266,7 +11265,7 @@
               </a:ln>
               <a:extLst>
                 <a:ext uri="{91240B29-F687-4f45-9708-019B960494DF}">
-                  <a14:hiddenLine xmlns="" xmlns:a14="http://schemas.microsoft.com/office/drawing/2010/main" w="9525">
+                  <a14:hiddenLine xmlns:a14="http://schemas.microsoft.com/office/drawing/2010/main" xmlns="" w="9525">
                     <a:solidFill>
                       <a:srgbClr val="000000"/>
                     </a:solidFill>
@@ -11331,7 +11330,7 @@
               </a:ln>
               <a:extLst>
                 <a:ext uri="{91240B29-F687-4f45-9708-019B960494DF}">
-                  <a14:hiddenLine xmlns="" xmlns:a14="http://schemas.microsoft.com/office/drawing/2010/main" w="9525">
+                  <a14:hiddenLine xmlns:a14="http://schemas.microsoft.com/office/drawing/2010/main" xmlns="" w="9525">
                     <a:solidFill>
                       <a:srgbClr val="000000"/>
                     </a:solidFill>
@@ -11421,7 +11420,7 @@
               </a:ln>
               <a:extLst>
                 <a:ext uri="{91240B29-F687-4f45-9708-019B960494DF}">
-                  <a14:hiddenLine xmlns="" xmlns:a14="http://schemas.microsoft.com/office/drawing/2010/main" w="9525">
+                  <a14:hiddenLine xmlns:a14="http://schemas.microsoft.com/office/drawing/2010/main" xmlns="" w="9525">
                     <a:solidFill>
                       <a:srgbClr val="000000"/>
                     </a:solidFill>
@@ -11483,7 +11482,7 @@
               </a:ln>
               <a:extLst>
                 <a:ext uri="{91240B29-F687-4f45-9708-019B960494DF}">
-                  <a14:hiddenLine xmlns="" xmlns:a14="http://schemas.microsoft.com/office/drawing/2010/main" w="9525">
+                  <a14:hiddenLine xmlns:a14="http://schemas.microsoft.com/office/drawing/2010/main" xmlns="" w="9525">
                     <a:solidFill>
                       <a:srgbClr val="000000"/>
                     </a:solidFill>
@@ -11573,7 +11572,7 @@
               </a:ln>
               <a:extLst>
                 <a:ext uri="{91240B29-F687-4f45-9708-019B960494DF}">
-                  <a14:hiddenLine xmlns="" xmlns:a14="http://schemas.microsoft.com/office/drawing/2010/main" w="9525">
+                  <a14:hiddenLine xmlns:a14="http://schemas.microsoft.com/office/drawing/2010/main" xmlns="" w="9525">
                     <a:solidFill>
                       <a:srgbClr val="000000"/>
                     </a:solidFill>
@@ -11638,7 +11637,7 @@
               </a:ln>
               <a:extLst>
                 <a:ext uri="{91240B29-F687-4f45-9708-019B960494DF}">
-                  <a14:hiddenLine xmlns="" xmlns:a14="http://schemas.microsoft.com/office/drawing/2010/main" w="9525">
+                  <a14:hiddenLine xmlns:a14="http://schemas.microsoft.com/office/drawing/2010/main" xmlns="" w="9525">
                     <a:solidFill>
                       <a:srgbClr val="000000"/>
                     </a:solidFill>
@@ -11700,7 +11699,7 @@
               </a:ln>
               <a:extLst>
                 <a:ext uri="{91240B29-F687-4f45-9708-019B960494DF}">
-                  <a14:hiddenLine xmlns="" xmlns:a14="http://schemas.microsoft.com/office/drawing/2010/main" w="9525">
+                  <a14:hiddenLine xmlns:a14="http://schemas.microsoft.com/office/drawing/2010/main" xmlns="" w="9525">
                     <a:solidFill>
                       <a:srgbClr val="000000"/>
                     </a:solidFill>
@@ -11790,7 +11789,7 @@
               </a:ln>
               <a:extLst>
                 <a:ext uri="{91240B29-F687-4f45-9708-019B960494DF}">
-                  <a14:hiddenLine xmlns="" xmlns:a14="http://schemas.microsoft.com/office/drawing/2010/main" w="9525">
+                  <a14:hiddenLine xmlns:a14="http://schemas.microsoft.com/office/drawing/2010/main" xmlns="" w="9525">
                     <a:solidFill>
                       <a:srgbClr val="000000"/>
                     </a:solidFill>
@@ -11880,7 +11879,7 @@
               </a:ln>
               <a:extLst>
                 <a:ext uri="{91240B29-F687-4f45-9708-019B960494DF}">
-                  <a14:hiddenLine xmlns="" xmlns:a14="http://schemas.microsoft.com/office/drawing/2010/main" w="9525">
+                  <a14:hiddenLine xmlns:a14="http://schemas.microsoft.com/office/drawing/2010/main" xmlns="" w="9525">
                     <a:solidFill>
                       <a:srgbClr val="000000"/>
                     </a:solidFill>
@@ -11945,7 +11944,7 @@
               </a:ln>
               <a:extLst>
                 <a:ext uri="{91240B29-F687-4f45-9708-019B960494DF}">
-                  <a14:hiddenLine xmlns="" xmlns:a14="http://schemas.microsoft.com/office/drawing/2010/main" w="9525">
+                  <a14:hiddenLine xmlns:a14="http://schemas.microsoft.com/office/drawing/2010/main" xmlns="" w="9525">
                     <a:solidFill>
                       <a:srgbClr val="000000"/>
                     </a:solidFill>
@@ -12065,7 +12064,7 @@
               </a:ln>
               <a:extLst>
                 <a:ext uri="{91240B29-F687-4f45-9708-019B960494DF}">
-                  <a14:hiddenLine xmlns="" xmlns:a14="http://schemas.microsoft.com/office/drawing/2010/main" w="9525">
+                  <a14:hiddenLine xmlns:a14="http://schemas.microsoft.com/office/drawing/2010/main" xmlns="" w="9525">
                     <a:solidFill>
                       <a:srgbClr val="000000"/>
                     </a:solidFill>
@@ -12163,7 +12162,7 @@
               </a:ln>
               <a:extLst>
                 <a:ext uri="{91240B29-F687-4f45-9708-019B960494DF}">
-                  <a14:hiddenLine xmlns="" xmlns:a14="http://schemas.microsoft.com/office/drawing/2010/main" w="9525">
+                  <a14:hiddenLine xmlns:a14="http://schemas.microsoft.com/office/drawing/2010/main" xmlns="" w="9525">
                     <a:solidFill>
                       <a:srgbClr val="000000"/>
                     </a:solidFill>
@@ -12278,7 +12277,7 @@
               </a:ln>
               <a:extLst>
                 <a:ext uri="{91240B29-F687-4f45-9708-019B960494DF}">
-                  <a14:hiddenLine xmlns="" xmlns:a14="http://schemas.microsoft.com/office/drawing/2010/main" w="9525">
+                  <a14:hiddenLine xmlns:a14="http://schemas.microsoft.com/office/drawing/2010/main" xmlns="" w="9525">
                     <a:solidFill>
                       <a:srgbClr val="000000"/>
                     </a:solidFill>
@@ -12368,7 +12367,7 @@
               </a:ln>
               <a:extLst>
                 <a:ext uri="{91240B29-F687-4f45-9708-019B960494DF}">
-                  <a14:hiddenLine xmlns="" xmlns:a14="http://schemas.microsoft.com/office/drawing/2010/main" w="9525">
+                  <a14:hiddenLine xmlns:a14="http://schemas.microsoft.com/office/drawing/2010/main" xmlns="" w="9525">
                     <a:solidFill>
                       <a:srgbClr val="000000"/>
                     </a:solidFill>
@@ -12433,7 +12432,7 @@
               </a:ln>
               <a:extLst>
                 <a:ext uri="{91240B29-F687-4f45-9708-019B960494DF}">
-                  <a14:hiddenLine xmlns="" xmlns:a14="http://schemas.microsoft.com/office/drawing/2010/main" w="9525">
+                  <a14:hiddenLine xmlns:a14="http://schemas.microsoft.com/office/drawing/2010/main" xmlns="" w="9525">
                     <a:solidFill>
                       <a:srgbClr val="000000"/>
                     </a:solidFill>
@@ -12523,7 +12522,7 @@
               </a:ln>
               <a:extLst>
                 <a:ext uri="{91240B29-F687-4f45-9708-019B960494DF}">
-                  <a14:hiddenLine xmlns="" xmlns:a14="http://schemas.microsoft.com/office/drawing/2010/main" w="9525">
+                  <a14:hiddenLine xmlns:a14="http://schemas.microsoft.com/office/drawing/2010/main" xmlns="" w="9525">
                     <a:solidFill>
                       <a:srgbClr val="000000"/>
                     </a:solidFill>
@@ -12591,7 +12590,7 @@
               </a:ln>
               <a:extLst>
                 <a:ext uri="{91240B29-F687-4f45-9708-019B960494DF}">
-                  <a14:hiddenLine xmlns="" xmlns:a14="http://schemas.microsoft.com/office/drawing/2010/main" w="9525">
+                  <a14:hiddenLine xmlns:a14="http://schemas.microsoft.com/office/drawing/2010/main" xmlns="" w="9525">
                     <a:solidFill>
                       <a:srgbClr val="000000"/>
                     </a:solidFill>
@@ -12681,7 +12680,7 @@
               </a:ln>
               <a:extLst>
                 <a:ext uri="{91240B29-F687-4f45-9708-019B960494DF}">
-                  <a14:hiddenLine xmlns="" xmlns:a14="http://schemas.microsoft.com/office/drawing/2010/main" w="9525">
+                  <a14:hiddenLine xmlns:a14="http://schemas.microsoft.com/office/drawing/2010/main" xmlns="" w="9525">
                     <a:solidFill>
                       <a:srgbClr val="000000"/>
                     </a:solidFill>
@@ -12749,7 +12748,7 @@
               </a:ln>
               <a:extLst>
                 <a:ext uri="{91240B29-F687-4f45-9708-019B960494DF}">
-                  <a14:hiddenLine xmlns="" xmlns:a14="http://schemas.microsoft.com/office/drawing/2010/main" w="9525">
+                  <a14:hiddenLine xmlns:a14="http://schemas.microsoft.com/office/drawing/2010/main" xmlns="" w="9525">
                     <a:solidFill>
                       <a:srgbClr val="000000"/>
                     </a:solidFill>
@@ -12839,7 +12838,7 @@
               </a:ln>
               <a:extLst>
                 <a:ext uri="{91240B29-F687-4f45-9708-019B960494DF}">
-                  <a14:hiddenLine xmlns="" xmlns:a14="http://schemas.microsoft.com/office/drawing/2010/main" w="9525">
+                  <a14:hiddenLine xmlns:a14="http://schemas.microsoft.com/office/drawing/2010/main" xmlns="" w="9525">
                     <a:solidFill>
                       <a:srgbClr val="000000"/>
                     </a:solidFill>
@@ -12873,7 +12872,7 @@
               </a:ln>
               <a:extLst>
                 <a:ext uri="{91240B29-F687-4f45-9708-019B960494DF}">
-                  <a14:hiddenLine xmlns="" xmlns:a14="http://schemas.microsoft.com/office/drawing/2010/main" w="9525">
+                  <a14:hiddenLine xmlns:a14="http://schemas.microsoft.com/office/drawing/2010/main" xmlns="" w="9525">
                     <a:solidFill>
                       <a:srgbClr val="000000"/>
                     </a:solidFill>
@@ -13013,7 +13012,7 @@
           <a:p>
             <a:fld id="{F34B6E3E-06F4-4326-ABDB-61EE022A2F5F}" type="datetimeFigureOut">
               <a:rPr lang="en-US" smtClean="0"/>
-              <a:t>8/29/2020</a:t>
+              <a:t>9/1/2020</a:t>
             </a:fld>
             <a:endParaRPr lang="en-US"/>
           </a:p>
@@ -14290,197 +14289,6 @@
 </file>
 
 <file path=ppt/slides/slide12.xml><?xml version="1.0" encoding="utf-8"?>
-<p:sld xmlns:a="http://schemas.openxmlformats.org/drawingml/2006/main" xmlns:r="http://schemas.openxmlformats.org/officeDocument/2006/relationships" xmlns:p="http://schemas.openxmlformats.org/presentationml/2006/main">
-  <p:cSld>
-    <p:spTree>
-      <p:nvGrpSpPr>
-        <p:cNvPr id="1" name=""/>
-        <p:cNvGrpSpPr/>
-        <p:nvPr/>
-      </p:nvGrpSpPr>
-      <p:grpSpPr>
-        <a:xfrm>
-          <a:off x="0" y="0"/>
-          <a:ext cx="0" cy="0"/>
-          <a:chOff x="0" y="0"/>
-          <a:chExt cx="0" cy="0"/>
-        </a:xfrm>
-      </p:grpSpPr>
-      <p:sp>
-        <p:nvSpPr>
-          <p:cNvPr id="7" name="Slide Number Placeholder 3"/>
-          <p:cNvSpPr>
-            <a:spLocks noGrp="1"/>
-          </p:cNvSpPr>
-          <p:nvPr>
-            <p:ph type="sldNum" sz="quarter" idx="4294967295"/>
-          </p:nvPr>
-        </p:nvSpPr>
-        <p:spPr>
-          <a:xfrm>
-            <a:off x="11568000" y="6525003"/>
-            <a:ext cx="428822" cy="196477"/>
-          </a:xfrm>
-          <a:prstGeom prst="rect">
-            <a:avLst/>
-          </a:prstGeom>
-        </p:spPr>
-        <p:txBody>
-          <a:bodyPr/>
-          <a:lstStyle/>
-          <a:p>
-            <a:pPr>
-              <a:defRPr/>
-            </a:pPr>
-            <a:fld id="{58452FF4-89E3-4D1B-9927-2DBDC00E58D7}" type="slidenum">
-              <a:rPr lang="en-US" smtClean="0"/>
-              <a:pPr>
-                <a:defRPr/>
-              </a:pPr>
-              <a:t>12</a:t>
-            </a:fld>
-            <a:endParaRPr lang="en-US" dirty="0"/>
-          </a:p>
-        </p:txBody>
-      </p:sp>
-      <p:sp>
-        <p:nvSpPr>
-          <p:cNvPr id="5" name="Content Placeholder 4"/>
-          <p:cNvSpPr>
-            <a:spLocks noGrp="1"/>
-          </p:cNvSpPr>
-          <p:nvPr>
-            <p:ph idx="1"/>
-          </p:nvPr>
-        </p:nvSpPr>
-        <p:spPr>
-          <a:xfrm>
-            <a:off x="1141413" y="1712549"/>
-            <a:ext cx="11696797" cy="5458202"/>
-          </a:xfrm>
-        </p:spPr>
-        <p:txBody>
-          <a:bodyPr>
-            <a:normAutofit/>
-          </a:bodyPr>
-          <a:lstStyle/>
-          <a:p>
-            <a:pPr>
-              <a:lnSpc>
-                <a:spcPct val="100000"/>
-              </a:lnSpc>
-            </a:pPr>
-            <a:r>
-              <a:rPr lang="en-US" dirty="0"/>
-              <a:t>Brute Force Attacks (also DDoS)</a:t>
-            </a:r>
-          </a:p>
-          <a:p>
-            <a:pPr>
-              <a:lnSpc>
-                <a:spcPct val="100000"/>
-              </a:lnSpc>
-            </a:pPr>
-            <a:r>
-              <a:rPr lang="en-US" dirty="0"/>
-              <a:t>Insufficient Access Control</a:t>
-            </a:r>
-          </a:p>
-          <a:p>
-            <a:pPr>
-              <a:lnSpc>
-                <a:spcPct val="100000"/>
-              </a:lnSpc>
-            </a:pPr>
-            <a:r>
-              <a:rPr lang="en-US" dirty="0"/>
-              <a:t>Too Much Information in Errors/Public Configuration</a:t>
-            </a:r>
-          </a:p>
-          <a:p>
-            <a:pPr>
-              <a:lnSpc>
-                <a:spcPct val="100000"/>
-              </a:lnSpc>
-            </a:pPr>
-            <a:r>
-              <a:rPr lang="en-US" dirty="0"/>
-              <a:t>Missing SSL (HTTPS) / MITM</a:t>
-            </a:r>
-          </a:p>
-          <a:p>
-            <a:pPr>
-              <a:lnSpc>
-                <a:spcPct val="100000"/>
-              </a:lnSpc>
-            </a:pPr>
-            <a:r>
-              <a:rPr lang="en-US" dirty="0"/>
-              <a:t>Phishing/Social Engineering</a:t>
-            </a:r>
-          </a:p>
-          <a:p>
-            <a:pPr>
-              <a:lnSpc>
-                <a:spcPct val="100000"/>
-              </a:lnSpc>
-            </a:pPr>
-            <a:r>
-              <a:rPr lang="en-US" dirty="0"/>
-              <a:t>Security Flows in Other Software We Use </a:t>
-            </a:r>
-          </a:p>
-          <a:p>
-            <a:pPr lvl="1">
-              <a:lnSpc>
-                <a:spcPct val="100000"/>
-              </a:lnSpc>
-            </a:pPr>
-            <a:endParaRPr lang="en-US" dirty="0"/>
-          </a:p>
-        </p:txBody>
-      </p:sp>
-      <p:sp>
-        <p:nvSpPr>
-          <p:cNvPr id="4" name="Title 3"/>
-          <p:cNvSpPr>
-            <a:spLocks noGrp="1"/>
-          </p:cNvSpPr>
-          <p:nvPr>
-            <p:ph type="title"/>
-          </p:nvPr>
-        </p:nvSpPr>
-        <p:spPr/>
-        <p:txBody>
-          <a:bodyPr/>
-          <a:lstStyle/>
-          <a:p>
-            <a:pPr>
-              <a:lnSpc>
-                <a:spcPct val="100000"/>
-              </a:lnSpc>
-            </a:pPr>
-            <a:r>
-              <a:rPr lang="en-US" sz="3600" dirty="0"/>
-              <a:t>Other threats</a:t>
-            </a:r>
-          </a:p>
-        </p:txBody>
-      </p:sp>
-    </p:spTree>
-    <p:extLst>
-      <p:ext uri="{BB962C8B-B14F-4D97-AF65-F5344CB8AC3E}">
-        <p14:creationId xmlns:p14="http://schemas.microsoft.com/office/powerpoint/2010/main" val="1330509294"/>
-      </p:ext>
-    </p:extLst>
-  </p:cSld>
-  <p:clrMapOvr>
-    <a:masterClrMapping/>
-  </p:clrMapOvr>
-</p:sld>
-</file>
-
-<file path=ppt/slides/slide13.xml><?xml version="1.0" encoding="utf-8"?>
 <p:sld xmlns:a="http://schemas.openxmlformats.org/drawingml/2006/main" xmlns:r="http://schemas.openxmlformats.org/officeDocument/2006/relationships" xmlns:p="http://schemas.openxmlformats.org/presentationml/2006/main">
   <p:cSld>
     <p:spTree>

</xml_diff>